<commit_message>
Update Analysis with deleted genomes
</commit_message>
<xml_diff>
--- a/FinalFigs/Figure4.pptx
+++ b/FinalFigs/Figure4.pptx
@@ -197,7 +197,7 @@
           <a:p>
             <a:fld id="{98C5DA18-8E66-E349-9B0B-0EB39F85D80A}" type="datetimeFigureOut">
               <a:rPr lang="en-US" smtClean="0"/>
-              <a:t>12/31/23</a:t>
+              <a:t>3/5/24</a:t>
             </a:fld>
             <a:endParaRPr lang="en-US"/>
           </a:p>
@@ -695,7 +695,7 @@
           <a:p>
             <a:fld id="{5CEBB436-31F7-2040-A69A-61599A9E8C3D}" type="datetimeFigureOut">
               <a:rPr lang="en-US" smtClean="0"/>
-              <a:t>12/31/23</a:t>
+              <a:t>3/5/24</a:t>
             </a:fld>
             <a:endParaRPr lang="en-US"/>
           </a:p>
@@ -893,7 +893,7 @@
           <a:p>
             <a:fld id="{5CEBB436-31F7-2040-A69A-61599A9E8C3D}" type="datetimeFigureOut">
               <a:rPr lang="en-US" smtClean="0"/>
-              <a:t>12/31/23</a:t>
+              <a:t>3/5/24</a:t>
             </a:fld>
             <a:endParaRPr lang="en-US"/>
           </a:p>
@@ -1101,7 +1101,7 @@
           <a:p>
             <a:fld id="{5CEBB436-31F7-2040-A69A-61599A9E8C3D}" type="datetimeFigureOut">
               <a:rPr lang="en-US" smtClean="0"/>
-              <a:t>12/31/23</a:t>
+              <a:t>3/5/24</a:t>
             </a:fld>
             <a:endParaRPr lang="en-US"/>
           </a:p>
@@ -1299,7 +1299,7 @@
           <a:p>
             <a:fld id="{5CEBB436-31F7-2040-A69A-61599A9E8C3D}" type="datetimeFigureOut">
               <a:rPr lang="en-US" smtClean="0"/>
-              <a:t>12/31/23</a:t>
+              <a:t>3/5/24</a:t>
             </a:fld>
             <a:endParaRPr lang="en-US"/>
           </a:p>
@@ -1574,7 +1574,7 @@
           <a:p>
             <a:fld id="{5CEBB436-31F7-2040-A69A-61599A9E8C3D}" type="datetimeFigureOut">
               <a:rPr lang="en-US" smtClean="0"/>
-              <a:t>12/31/23</a:t>
+              <a:t>3/5/24</a:t>
             </a:fld>
             <a:endParaRPr lang="en-US"/>
           </a:p>
@@ -1839,7 +1839,7 @@
           <a:p>
             <a:fld id="{5CEBB436-31F7-2040-A69A-61599A9E8C3D}" type="datetimeFigureOut">
               <a:rPr lang="en-US" smtClean="0"/>
-              <a:t>12/31/23</a:t>
+              <a:t>3/5/24</a:t>
             </a:fld>
             <a:endParaRPr lang="en-US"/>
           </a:p>
@@ -2251,7 +2251,7 @@
           <a:p>
             <a:fld id="{5CEBB436-31F7-2040-A69A-61599A9E8C3D}" type="datetimeFigureOut">
               <a:rPr lang="en-US" smtClean="0"/>
-              <a:t>12/31/23</a:t>
+              <a:t>3/5/24</a:t>
             </a:fld>
             <a:endParaRPr lang="en-US"/>
           </a:p>
@@ -2392,7 +2392,7 @@
           <a:p>
             <a:fld id="{5CEBB436-31F7-2040-A69A-61599A9E8C3D}" type="datetimeFigureOut">
               <a:rPr lang="en-US" smtClean="0"/>
-              <a:t>12/31/23</a:t>
+              <a:t>3/5/24</a:t>
             </a:fld>
             <a:endParaRPr lang="en-US"/>
           </a:p>
@@ -2505,7 +2505,7 @@
           <a:p>
             <a:fld id="{5CEBB436-31F7-2040-A69A-61599A9E8C3D}" type="datetimeFigureOut">
               <a:rPr lang="en-US" smtClean="0"/>
-              <a:t>12/31/23</a:t>
+              <a:t>3/5/24</a:t>
             </a:fld>
             <a:endParaRPr lang="en-US"/>
           </a:p>
@@ -2816,7 +2816,7 @@
           <a:p>
             <a:fld id="{5CEBB436-31F7-2040-A69A-61599A9E8C3D}" type="datetimeFigureOut">
               <a:rPr lang="en-US" smtClean="0"/>
-              <a:t>12/31/23</a:t>
+              <a:t>3/5/24</a:t>
             </a:fld>
             <a:endParaRPr lang="en-US"/>
           </a:p>
@@ -3104,7 +3104,7 @@
           <a:p>
             <a:fld id="{5CEBB436-31F7-2040-A69A-61599A9E8C3D}" type="datetimeFigureOut">
               <a:rPr lang="en-US" smtClean="0"/>
-              <a:t>12/31/23</a:t>
+              <a:t>3/5/24</a:t>
             </a:fld>
             <a:endParaRPr lang="en-US"/>
           </a:p>
@@ -3345,7 +3345,7 @@
           <a:p>
             <a:fld id="{5CEBB436-31F7-2040-A69A-61599A9E8C3D}" type="datetimeFigureOut">
               <a:rPr lang="en-US" smtClean="0"/>
-              <a:t>12/31/23</a:t>
+              <a:t>3/5/24</a:t>
             </a:fld>
             <a:endParaRPr lang="en-US"/>
           </a:p>
@@ -3764,10 +3764,10 @@
       </p:grpSpPr>
       <p:pic>
         <p:nvPicPr>
-          <p:cNvPr id="19" name="Picture 18">
-            <a:extLst>
-              <a:ext uri="{FF2B5EF4-FFF2-40B4-BE49-F238E27FC236}">
-                <a16:creationId xmlns:a16="http://schemas.microsoft.com/office/drawing/2014/main" id="{9E22B043-6FA8-BEB0-9A23-14ABE5A8C66D}"/>
+          <p:cNvPr id="22" name="Picture 21">
+            <a:extLst>
+              <a:ext uri="{FF2B5EF4-FFF2-40B4-BE49-F238E27FC236}">
+                <a16:creationId xmlns:a16="http://schemas.microsoft.com/office/drawing/2014/main" id="{1427AFE1-B7BF-0E75-0B91-FC92173ACDFF}"/>
               </a:ext>
             </a:extLst>
           </p:cNvPr>
@@ -3806,7 +3806,7 @@
         </p:nvSpPr>
         <p:spPr>
           <a:xfrm>
-            <a:off x="2768270" y="79825"/>
+            <a:off x="2768270" y="79904"/>
             <a:ext cx="811658" cy="123111"/>
           </a:xfrm>
           <a:prstGeom prst="rect">
@@ -3842,7 +3842,7 @@
         </p:nvSpPr>
         <p:spPr>
           <a:xfrm>
-            <a:off x="2858756" y="773473"/>
+            <a:off x="2858756" y="782177"/>
             <a:ext cx="721172" cy="123111"/>
           </a:xfrm>
           <a:prstGeom prst="rect">
@@ -3878,7 +3878,7 @@
         </p:nvSpPr>
         <p:spPr>
           <a:xfrm>
-            <a:off x="2768270" y="1458898"/>
+            <a:off x="2768270" y="1476069"/>
             <a:ext cx="811658" cy="123111"/>
           </a:xfrm>
           <a:prstGeom prst="rect">
@@ -3914,7 +3914,7 @@
         </p:nvSpPr>
         <p:spPr>
           <a:xfrm>
-            <a:off x="2858756" y="2143191"/>
+            <a:off x="2858756" y="2160362"/>
             <a:ext cx="721172" cy="123111"/>
           </a:xfrm>
           <a:prstGeom prst="rect">
@@ -3950,7 +3950,7 @@
         </p:nvSpPr>
         <p:spPr>
           <a:xfrm>
-            <a:off x="2858756" y="2835273"/>
+            <a:off x="2858756" y="2843977"/>
             <a:ext cx="721172" cy="123111"/>
           </a:xfrm>
           <a:prstGeom prst="rect">
@@ -3986,7 +3986,7 @@
         </p:nvSpPr>
         <p:spPr>
           <a:xfrm>
-            <a:off x="2858756" y="3534964"/>
+            <a:off x="2858756" y="3526655"/>
             <a:ext cx="721172" cy="123111"/>
           </a:xfrm>
           <a:prstGeom prst="rect">
@@ -4022,7 +4022,7 @@
         </p:nvSpPr>
         <p:spPr>
           <a:xfrm>
-            <a:off x="2768270" y="4207223"/>
+            <a:off x="2768270" y="4215848"/>
             <a:ext cx="811658" cy="123111"/>
           </a:xfrm>
           <a:prstGeom prst="rect">
@@ -4058,7 +4058,7 @@
         </p:nvSpPr>
         <p:spPr>
           <a:xfrm>
-            <a:off x="2858756" y="4888626"/>
+            <a:off x="2858756" y="4897251"/>
             <a:ext cx="721172" cy="123111"/>
           </a:xfrm>
           <a:prstGeom prst="rect">
@@ -4094,7 +4094,7 @@
         </p:nvSpPr>
         <p:spPr>
           <a:xfrm>
-            <a:off x="2858756" y="5595046"/>
+            <a:off x="2858756" y="5595125"/>
             <a:ext cx="721172" cy="123111"/>
           </a:xfrm>
           <a:prstGeom prst="rect">
@@ -4138,8 +4138,8 @@
         </p:blipFill>
         <p:spPr>
           <a:xfrm>
-            <a:off x="2939848" y="3667441"/>
-            <a:ext cx="640080" cy="512064"/>
+            <a:off x="2939848" y="3650507"/>
+            <a:ext cx="640080" cy="548640"/>
           </a:xfrm>
           <a:prstGeom prst="rect">
             <a:avLst/>
@@ -4168,8 +4168,8 @@
         </p:blipFill>
         <p:spPr>
           <a:xfrm>
-            <a:off x="2939848" y="1610826"/>
-            <a:ext cx="640080" cy="512064"/>
+            <a:off x="2939848" y="1602359"/>
+            <a:ext cx="640080" cy="548640"/>
           </a:xfrm>
           <a:prstGeom prst="rect">
             <a:avLst/>
@@ -4198,8 +4198,8 @@
         </p:blipFill>
         <p:spPr>
           <a:xfrm>
-            <a:off x="2939848" y="5726703"/>
-            <a:ext cx="640080" cy="512064"/>
+            <a:off x="2939848" y="5709769"/>
+            <a:ext cx="640080" cy="548640"/>
           </a:xfrm>
           <a:prstGeom prst="rect">
             <a:avLst/>
@@ -4228,8 +4228,8 @@
         </p:blipFill>
         <p:spPr>
           <a:xfrm>
-            <a:off x="2939848" y="238552"/>
-            <a:ext cx="640080" cy="512064"/>
+            <a:off x="2939848" y="212914"/>
+            <a:ext cx="640080" cy="548640"/>
           </a:xfrm>
           <a:prstGeom prst="rect">
             <a:avLst/>
@@ -4258,8 +4258,8 @@
         </p:blipFill>
         <p:spPr>
           <a:xfrm>
-            <a:off x="2939848" y="2301924"/>
-            <a:ext cx="640080" cy="512064"/>
+            <a:off x="2939848" y="2268056"/>
+            <a:ext cx="640080" cy="548640"/>
           </a:xfrm>
           <a:prstGeom prst="rect">
             <a:avLst/>
@@ -4288,8 +4288,8 @@
         </p:blipFill>
         <p:spPr>
           <a:xfrm>
-            <a:off x="2939848" y="4354930"/>
-            <a:ext cx="640080" cy="512064"/>
+            <a:off x="2939848" y="4346463"/>
+            <a:ext cx="640080" cy="548640"/>
           </a:xfrm>
           <a:prstGeom prst="rect">
             <a:avLst/>
@@ -4318,8 +4318,8 @@
         </p:blipFill>
         <p:spPr>
           <a:xfrm>
-            <a:off x="2939848" y="2994006"/>
-            <a:ext cx="640080" cy="512064"/>
+            <a:off x="2939848" y="2977072"/>
+            <a:ext cx="640080" cy="548640"/>
           </a:xfrm>
           <a:prstGeom prst="rect">
             <a:avLst/>
@@ -4348,8 +4348,8 @@
         </p:blipFill>
         <p:spPr>
           <a:xfrm>
-            <a:off x="2939848" y="5033369"/>
-            <a:ext cx="640080" cy="512064"/>
+            <a:off x="2939848" y="5016435"/>
+            <a:ext cx="640080" cy="548640"/>
           </a:xfrm>
           <a:prstGeom prst="rect">
             <a:avLst/>
@@ -4378,8 +4378,8 @@
         </p:blipFill>
         <p:spPr>
           <a:xfrm>
-            <a:off x="2939848" y="926486"/>
-            <a:ext cx="640080" cy="512064"/>
+            <a:off x="2939848" y="918019"/>
+            <a:ext cx="640080" cy="548640"/>
           </a:xfrm>
           <a:prstGeom prst="rect">
             <a:avLst/>

</xml_diff>